<commit_message>
Précision dans le PowerPoint sur la suppression du fichier RF.dat
</commit_message>
<xml_diff>
--- a/PowerPoint De Presentation/Presentation_Projet_Python.pptx
+++ b/PowerPoint De Presentation/Presentation_Projet_Python.pptx
@@ -7600,7 +7600,7 @@
         <p:spPr>
           <a:xfrm>
             <a:off x="726779" y="1423213"/>
-            <a:ext cx="8001585" cy="2215991"/>
+            <a:ext cx="8001585" cy="2462213"/>
           </a:xfrm>
           <a:prstGeom prst="rect">
             <a:avLst/>
@@ -7632,7 +7632,6 @@
             </a:r>
           </a:p>
           <a:p>
-            <a:pPr rtl="0"/>
             <a:r>
               <a:rPr lang="fr-FR" i="0" dirty="0"/>
               <a:t>Elle est constituée de l’ensemble des fichiers nécessaire au fonctionnement d’une API Django. Les seuls choses qui nous importent vraiment, sont les 4 fichiers .</a:t>
@@ -7643,7 +7642,23 @@
             </a:r>
             <a:r>
               <a:rPr lang="fr-FR" i="0" dirty="0"/>
-              <a:t> qui contiennent les 4 modèles de Machine Learning que j’ai retenu et l’autre partie qui nous importe, c’est le fichier views.py situé dans le sous-dossier </a:t>
+              <a:t> qui contiennent les 4 modèles de Machine Learning (pour le fichier .</a:t>
+            </a:r>
+            <a:r>
+              <a:rPr lang="fr-FR" i="0" dirty="0" err="1"/>
+              <a:t>dat</a:t>
+            </a:r>
+            <a:r>
+              <a:rPr lang="fr-FR" i="0" dirty="0"/>
+              <a:t> du </a:t>
+            </a:r>
+            <a:r>
+              <a:rPr lang="fr-FR" i="0" dirty="0" err="1"/>
+              <a:t>randomForest</a:t>
+            </a:r>
+            <a:r>
+              <a:rPr lang="fr-FR" i="0" dirty="0"/>
+              <a:t>, il faudra réexécuter la méthode associée car le fichier était trop volumineux pour GitHub) que j’ai retenu et l’autre partie qui nous importe, c’est le fichier views.py situé dans le sous-dossier </a:t>
             </a:r>
             <a:r>
               <a:rPr lang="fr-FR" i="0" dirty="0" err="1"/>
@@ -9583,7 +9598,7 @@
         </p:nvGrpSpPr>
         <p:grpSpPr>
           <a:xfrm>
-            <a:off x="8301920" y="-590939"/>
+            <a:off x="8024835" y="-590939"/>
             <a:ext cx="8739666" cy="8346238"/>
             <a:chOff x="4597682" y="-439156"/>
             <a:chExt cx="7594320" cy="7252450"/>

</xml_diff>